<commit_message>
admin: update timeline diagram
</commit_message>
<xml_diff>
--- a/diagrams/admin/timeline.pptx
+++ b/diagrams/admin/timeline.pptx
@@ -305,7 +305,7 @@
             <a:fld id="{1D8BD707-D9CF-40AE-B4C6-C98DA3205C09}" type="datetimeFigureOut">
               <a:rPr lang="en-US" smtClean="0"/>
               <a:pPr/>
-              <a:t>7/27/2017</a:t>
+              <a:t>9/21/2017</a:t>
             </a:fld>
             <a:endParaRPr lang="en-US"/>
           </a:p>
@@ -472,7 +472,7 @@
             <a:fld id="{1D8BD707-D9CF-40AE-B4C6-C98DA3205C09}" type="datetimeFigureOut">
               <a:rPr lang="en-US" smtClean="0"/>
               <a:pPr/>
-              <a:t>7/27/2017</a:t>
+              <a:t>9/21/2017</a:t>
             </a:fld>
             <a:endParaRPr lang="en-US"/>
           </a:p>
@@ -649,7 +649,7 @@
             <a:fld id="{1D8BD707-D9CF-40AE-B4C6-C98DA3205C09}" type="datetimeFigureOut">
               <a:rPr lang="en-US" smtClean="0"/>
               <a:pPr/>
-              <a:t>7/27/2017</a:t>
+              <a:t>9/21/2017</a:t>
             </a:fld>
             <a:endParaRPr lang="en-US"/>
           </a:p>
@@ -816,7 +816,7 @@
             <a:fld id="{1D8BD707-D9CF-40AE-B4C6-C98DA3205C09}" type="datetimeFigureOut">
               <a:rPr lang="en-US" smtClean="0"/>
               <a:pPr/>
-              <a:t>7/27/2017</a:t>
+              <a:t>9/21/2017</a:t>
             </a:fld>
             <a:endParaRPr lang="en-US"/>
           </a:p>
@@ -1059,7 +1059,7 @@
             <a:fld id="{1D8BD707-D9CF-40AE-B4C6-C98DA3205C09}" type="datetimeFigureOut">
               <a:rPr lang="en-US" smtClean="0"/>
               <a:pPr/>
-              <a:t>7/27/2017</a:t>
+              <a:t>9/21/2017</a:t>
             </a:fld>
             <a:endParaRPr lang="en-US"/>
           </a:p>
@@ -1344,7 +1344,7 @@
             <a:fld id="{1D8BD707-D9CF-40AE-B4C6-C98DA3205C09}" type="datetimeFigureOut">
               <a:rPr lang="en-US" smtClean="0"/>
               <a:pPr/>
-              <a:t>7/27/2017</a:t>
+              <a:t>9/21/2017</a:t>
             </a:fld>
             <a:endParaRPr lang="en-US"/>
           </a:p>
@@ -1763,7 +1763,7 @@
             <a:fld id="{1D8BD707-D9CF-40AE-B4C6-C98DA3205C09}" type="datetimeFigureOut">
               <a:rPr lang="en-US" smtClean="0"/>
               <a:pPr/>
-              <a:t>7/27/2017</a:t>
+              <a:t>9/21/2017</a:t>
             </a:fld>
             <a:endParaRPr lang="en-US"/>
           </a:p>
@@ -1878,7 +1878,7 @@
             <a:fld id="{1D8BD707-D9CF-40AE-B4C6-C98DA3205C09}" type="datetimeFigureOut">
               <a:rPr lang="en-US" smtClean="0"/>
               <a:pPr/>
-              <a:t>7/27/2017</a:t>
+              <a:t>9/21/2017</a:t>
             </a:fld>
             <a:endParaRPr lang="en-US"/>
           </a:p>
@@ -1970,7 +1970,7 @@
             <a:fld id="{1D8BD707-D9CF-40AE-B4C6-C98DA3205C09}" type="datetimeFigureOut">
               <a:rPr lang="en-US" smtClean="0"/>
               <a:pPr/>
-              <a:t>7/27/2017</a:t>
+              <a:t>9/21/2017</a:t>
             </a:fld>
             <a:endParaRPr lang="en-US"/>
           </a:p>
@@ -2244,7 +2244,7 @@
             <a:fld id="{1D8BD707-D9CF-40AE-B4C6-C98DA3205C09}" type="datetimeFigureOut">
               <a:rPr lang="en-US" smtClean="0"/>
               <a:pPr/>
-              <a:t>7/27/2017</a:t>
+              <a:t>9/21/2017</a:t>
             </a:fld>
             <a:endParaRPr lang="en-US"/>
           </a:p>
@@ -2494,7 +2494,7 @@
             <a:fld id="{1D8BD707-D9CF-40AE-B4C6-C98DA3205C09}" type="datetimeFigureOut">
               <a:rPr lang="en-US" smtClean="0"/>
               <a:pPr/>
-              <a:t>7/27/2017</a:t>
+              <a:t>9/21/2017</a:t>
             </a:fld>
             <a:endParaRPr lang="en-US"/>
           </a:p>
@@ -2704,7 +2704,7 @@
             <a:fld id="{1D8BD707-D9CF-40AE-B4C6-C98DA3205C09}" type="datetimeFigureOut">
               <a:rPr lang="en-US" smtClean="0"/>
               <a:pPr/>
-              <a:t>7/27/2017</a:t>
+              <a:t>9/21/2017</a:t>
             </a:fld>
             <a:endParaRPr lang="en-US"/>
           </a:p>
@@ -3920,7 +3920,7 @@
         </p:nvSpPr>
         <p:spPr>
           <a:xfrm>
-            <a:off x="7594869" y="4295394"/>
+            <a:off x="7594869" y="4313150"/>
             <a:ext cx="482331" cy="276606"/>
           </a:xfrm>
           <a:prstGeom prst="foldedCorner">
@@ -4479,7 +4479,7 @@
         <p:spPr>
           <a:xfrm>
             <a:off x="7836035" y="4260715"/>
-            <a:ext cx="0" cy="34679"/>
+            <a:ext cx="0" cy="52435"/>
           </a:xfrm>
           <a:prstGeom prst="line">
             <a:avLst/>
@@ -4518,6 +4518,366 @@
           <a:xfrm>
             <a:off x="4695110" y="4208287"/>
             <a:ext cx="1" cy="139535"/>
+          </a:xfrm>
+          <a:prstGeom prst="line">
+            <a:avLst/>
+          </a:prstGeom>
+          <a:ln>
+            <a:solidFill>
+              <a:srgbClr val="C00000"/>
+            </a:solidFill>
+          </a:ln>
+        </p:spPr>
+        <p:style>
+          <a:lnRef idx="1">
+            <a:schemeClr val="accent1"/>
+          </a:lnRef>
+          <a:fillRef idx="0">
+            <a:schemeClr val="accent1"/>
+          </a:fillRef>
+          <a:effectRef idx="0">
+            <a:schemeClr val="accent1"/>
+          </a:effectRef>
+          <a:fontRef idx="minor">
+            <a:schemeClr val="tx1"/>
+          </a:fontRef>
+        </p:style>
+      </p:cxnSp>
+      <p:sp>
+        <p:nvSpPr>
+          <p:cNvPr id="26" name="Folded Corner 25"/>
+          <p:cNvSpPr>
+            <a:spLocks noChangeAspect="1"/>
+          </p:cNvSpPr>
+          <p:nvPr/>
+        </p:nvSpPr>
+        <p:spPr>
+          <a:xfrm>
+            <a:off x="5053543" y="4349656"/>
+            <a:ext cx="314768" cy="180512"/>
+          </a:xfrm>
+          <a:prstGeom prst="foldedCorner">
+            <a:avLst/>
+          </a:prstGeom>
+          <a:solidFill>
+            <a:schemeClr val="accent2">
+              <a:lumMod val="60000"/>
+              <a:lumOff val="40000"/>
+            </a:schemeClr>
+          </a:solidFill>
+          <a:ln w="3175">
+            <a:solidFill>
+              <a:srgbClr val="C00000"/>
+            </a:solidFill>
+          </a:ln>
+        </p:spPr>
+        <p:style>
+          <a:lnRef idx="2">
+            <a:schemeClr val="accent1">
+              <a:shade val="50000"/>
+            </a:schemeClr>
+          </a:lnRef>
+          <a:fillRef idx="1">
+            <a:schemeClr val="accent1"/>
+          </a:fillRef>
+          <a:effectRef idx="0">
+            <a:schemeClr val="accent1"/>
+          </a:effectRef>
+          <a:fontRef idx="minor">
+            <a:schemeClr val="lt1"/>
+          </a:fontRef>
+        </p:style>
+        <p:txBody>
+          <a:bodyPr lIns="0" tIns="0" rIns="0" bIns="0" rtlCol="0" anchor="ctr"/>
+          <a:lstStyle/>
+          <a:p>
+            <a:pPr algn="ctr"/>
+            <a:endParaRPr lang="en-SG" sz="900" dirty="0"/>
+          </a:p>
+        </p:txBody>
+      </p:sp>
+      <p:cxnSp>
+        <p:nvCxnSpPr>
+          <p:cNvPr id="27" name="Straight Connector 26"/>
+          <p:cNvCxnSpPr>
+            <a:endCxn id="26" idx="0"/>
+          </p:cNvCxnSpPr>
+          <p:nvPr/>
+        </p:nvCxnSpPr>
+        <p:spPr>
+          <a:xfrm>
+            <a:off x="5210926" y="4214502"/>
+            <a:ext cx="1" cy="135154"/>
+          </a:xfrm>
+          <a:prstGeom prst="line">
+            <a:avLst/>
+          </a:prstGeom>
+          <a:ln>
+            <a:solidFill>
+              <a:srgbClr val="C00000"/>
+            </a:solidFill>
+          </a:ln>
+        </p:spPr>
+        <p:style>
+          <a:lnRef idx="1">
+            <a:schemeClr val="accent1"/>
+          </a:lnRef>
+          <a:fillRef idx="0">
+            <a:schemeClr val="accent1"/>
+          </a:fillRef>
+          <a:effectRef idx="0">
+            <a:schemeClr val="accent1"/>
+          </a:effectRef>
+          <a:fontRef idx="minor">
+            <a:schemeClr val="tx1"/>
+          </a:fontRef>
+        </p:style>
+      </p:cxnSp>
+      <p:sp>
+        <p:nvSpPr>
+          <p:cNvPr id="28" name="Folded Corner 27"/>
+          <p:cNvSpPr>
+            <a:spLocks noChangeAspect="1"/>
+          </p:cNvSpPr>
+          <p:nvPr/>
+        </p:nvSpPr>
+        <p:spPr>
+          <a:xfrm>
+            <a:off x="5545990" y="4339654"/>
+            <a:ext cx="380870" cy="218419"/>
+          </a:xfrm>
+          <a:prstGeom prst="foldedCorner">
+            <a:avLst/>
+          </a:prstGeom>
+          <a:solidFill>
+            <a:schemeClr val="accent2">
+              <a:lumMod val="60000"/>
+              <a:lumOff val="40000"/>
+            </a:schemeClr>
+          </a:solidFill>
+          <a:ln w="3175">
+            <a:solidFill>
+              <a:srgbClr val="C00000"/>
+            </a:solidFill>
+          </a:ln>
+        </p:spPr>
+        <p:style>
+          <a:lnRef idx="2">
+            <a:schemeClr val="accent1">
+              <a:shade val="50000"/>
+            </a:schemeClr>
+          </a:lnRef>
+          <a:fillRef idx="1">
+            <a:schemeClr val="accent1"/>
+          </a:fillRef>
+          <a:effectRef idx="0">
+            <a:schemeClr val="accent1"/>
+          </a:effectRef>
+          <a:fontRef idx="minor">
+            <a:schemeClr val="lt1"/>
+          </a:fontRef>
+        </p:style>
+        <p:txBody>
+          <a:bodyPr lIns="0" tIns="0" rIns="0" bIns="0" rtlCol="0" anchor="ctr"/>
+          <a:lstStyle/>
+          <a:p>
+            <a:pPr algn="ctr"/>
+            <a:endParaRPr lang="en-SG" sz="900" dirty="0"/>
+          </a:p>
+        </p:txBody>
+      </p:sp>
+      <p:cxnSp>
+        <p:nvCxnSpPr>
+          <p:cNvPr id="29" name="Straight Connector 28"/>
+          <p:cNvCxnSpPr>
+            <a:endCxn id="28" idx="0"/>
+          </p:cNvCxnSpPr>
+          <p:nvPr/>
+        </p:nvCxnSpPr>
+        <p:spPr>
+          <a:xfrm>
+            <a:off x="5736424" y="4223453"/>
+            <a:ext cx="1" cy="116201"/>
+          </a:xfrm>
+          <a:prstGeom prst="line">
+            <a:avLst/>
+          </a:prstGeom>
+          <a:ln>
+            <a:solidFill>
+              <a:srgbClr val="C00000"/>
+            </a:solidFill>
+          </a:ln>
+        </p:spPr>
+        <p:style>
+          <a:lnRef idx="1">
+            <a:schemeClr val="accent1"/>
+          </a:lnRef>
+          <a:fillRef idx="0">
+            <a:schemeClr val="accent1"/>
+          </a:fillRef>
+          <a:effectRef idx="0">
+            <a:schemeClr val="accent1"/>
+          </a:effectRef>
+          <a:fontRef idx="minor">
+            <a:schemeClr val="tx1"/>
+          </a:fontRef>
+        </p:style>
+      </p:cxnSp>
+      <p:sp>
+        <p:nvSpPr>
+          <p:cNvPr id="30" name="Folded Corner 29"/>
+          <p:cNvSpPr>
+            <a:spLocks noChangeAspect="1"/>
+          </p:cNvSpPr>
+          <p:nvPr/>
+        </p:nvSpPr>
+        <p:spPr>
+          <a:xfrm>
+            <a:off x="6555515" y="4336191"/>
+            <a:ext cx="410699" cy="235527"/>
+          </a:xfrm>
+          <a:prstGeom prst="foldedCorner">
+            <a:avLst/>
+          </a:prstGeom>
+          <a:solidFill>
+            <a:schemeClr val="accent2">
+              <a:lumMod val="60000"/>
+              <a:lumOff val="40000"/>
+            </a:schemeClr>
+          </a:solidFill>
+          <a:ln w="3175">
+            <a:solidFill>
+              <a:srgbClr val="C00000"/>
+            </a:solidFill>
+          </a:ln>
+        </p:spPr>
+        <p:style>
+          <a:lnRef idx="2">
+            <a:schemeClr val="accent1">
+              <a:shade val="50000"/>
+            </a:schemeClr>
+          </a:lnRef>
+          <a:fillRef idx="1">
+            <a:schemeClr val="accent1"/>
+          </a:fillRef>
+          <a:effectRef idx="0">
+            <a:schemeClr val="accent1"/>
+          </a:effectRef>
+          <a:fontRef idx="minor">
+            <a:schemeClr val="lt1"/>
+          </a:fontRef>
+        </p:style>
+        <p:txBody>
+          <a:bodyPr lIns="0" tIns="0" rIns="0" bIns="0" rtlCol="0" anchor="ctr"/>
+          <a:lstStyle/>
+          <a:p>
+            <a:pPr algn="ctr"/>
+            <a:endParaRPr lang="en-SG" sz="900" dirty="0"/>
+          </a:p>
+        </p:txBody>
+      </p:sp>
+      <p:cxnSp>
+        <p:nvCxnSpPr>
+          <p:cNvPr id="31" name="Straight Connector 30"/>
+          <p:cNvCxnSpPr>
+            <a:endCxn id="30" idx="0"/>
+          </p:cNvCxnSpPr>
+          <p:nvPr/>
+        </p:nvCxnSpPr>
+        <p:spPr>
+          <a:xfrm>
+            <a:off x="6760865" y="4256969"/>
+            <a:ext cx="0" cy="79222"/>
+          </a:xfrm>
+          <a:prstGeom prst="line">
+            <a:avLst/>
+          </a:prstGeom>
+          <a:ln>
+            <a:solidFill>
+              <a:srgbClr val="C00000"/>
+            </a:solidFill>
+          </a:ln>
+        </p:spPr>
+        <p:style>
+          <a:lnRef idx="1">
+            <a:schemeClr val="accent1"/>
+          </a:lnRef>
+          <a:fillRef idx="0">
+            <a:schemeClr val="accent1"/>
+          </a:fillRef>
+          <a:effectRef idx="0">
+            <a:schemeClr val="accent1"/>
+          </a:effectRef>
+          <a:fontRef idx="minor">
+            <a:schemeClr val="tx1"/>
+          </a:fontRef>
+        </p:style>
+      </p:cxnSp>
+      <p:sp>
+        <p:nvSpPr>
+          <p:cNvPr id="32" name="Folded Corner 31"/>
+          <p:cNvSpPr>
+            <a:spLocks noChangeAspect="1"/>
+          </p:cNvSpPr>
+          <p:nvPr/>
+        </p:nvSpPr>
+        <p:spPr>
+          <a:xfrm>
+            <a:off x="7073951" y="4336392"/>
+            <a:ext cx="438483" cy="251460"/>
+          </a:xfrm>
+          <a:prstGeom prst="foldedCorner">
+            <a:avLst/>
+          </a:prstGeom>
+          <a:solidFill>
+            <a:schemeClr val="accent2">
+              <a:lumMod val="60000"/>
+              <a:lumOff val="40000"/>
+            </a:schemeClr>
+          </a:solidFill>
+          <a:ln w="3175">
+            <a:solidFill>
+              <a:srgbClr val="C00000"/>
+            </a:solidFill>
+          </a:ln>
+        </p:spPr>
+        <p:style>
+          <a:lnRef idx="2">
+            <a:schemeClr val="accent1">
+              <a:shade val="50000"/>
+            </a:schemeClr>
+          </a:lnRef>
+          <a:fillRef idx="1">
+            <a:schemeClr val="accent1"/>
+          </a:fillRef>
+          <a:effectRef idx="0">
+            <a:schemeClr val="accent1"/>
+          </a:effectRef>
+          <a:fontRef idx="minor">
+            <a:schemeClr val="lt1"/>
+          </a:fontRef>
+        </p:style>
+        <p:txBody>
+          <a:bodyPr lIns="0" tIns="0" rIns="0" bIns="0" rtlCol="0" anchor="ctr"/>
+          <a:lstStyle/>
+          <a:p>
+            <a:pPr algn="ctr"/>
+            <a:endParaRPr lang="en-SG" sz="900" dirty="0"/>
+          </a:p>
+        </p:txBody>
+      </p:sp>
+      <p:cxnSp>
+        <p:nvCxnSpPr>
+          <p:cNvPr id="33" name="Straight Connector 32"/>
+          <p:cNvCxnSpPr>
+            <a:endCxn id="32" idx="0"/>
+          </p:cNvCxnSpPr>
+          <p:nvPr/>
+        </p:nvCxnSpPr>
+        <p:spPr>
+          <a:xfrm>
+            <a:off x="7293193" y="4265137"/>
+            <a:ext cx="0" cy="71255"/>
           </a:xfrm>
           <a:prstGeom prst="line">
             <a:avLst/>

</xml_diff>

<commit_message>
admin/timeline: AB-1 -> AB1 etc.
</commit_message>
<xml_diff>
--- a/diagrams/admin/timeline.pptx
+++ b/diagrams/admin/timeline.pptx
@@ -305,7 +305,7 @@
             <a:fld id="{1D8BD707-D9CF-40AE-B4C6-C98DA3205C09}" type="datetimeFigureOut">
               <a:rPr lang="en-US" smtClean="0"/>
               <a:pPr/>
-              <a:t>9/21/2017</a:t>
+              <a:t>31-Dec-17</a:t>
             </a:fld>
             <a:endParaRPr lang="en-US"/>
           </a:p>
@@ -472,7 +472,7 @@
             <a:fld id="{1D8BD707-D9CF-40AE-B4C6-C98DA3205C09}" type="datetimeFigureOut">
               <a:rPr lang="en-US" smtClean="0"/>
               <a:pPr/>
-              <a:t>9/21/2017</a:t>
+              <a:t>31-Dec-17</a:t>
             </a:fld>
             <a:endParaRPr lang="en-US"/>
           </a:p>
@@ -649,7 +649,7 @@
             <a:fld id="{1D8BD707-D9CF-40AE-B4C6-C98DA3205C09}" type="datetimeFigureOut">
               <a:rPr lang="en-US" smtClean="0"/>
               <a:pPr/>
-              <a:t>9/21/2017</a:t>
+              <a:t>31-Dec-17</a:t>
             </a:fld>
             <a:endParaRPr lang="en-US"/>
           </a:p>
@@ -816,7 +816,7 @@
             <a:fld id="{1D8BD707-D9CF-40AE-B4C6-C98DA3205C09}" type="datetimeFigureOut">
               <a:rPr lang="en-US" smtClean="0"/>
               <a:pPr/>
-              <a:t>9/21/2017</a:t>
+              <a:t>31-Dec-17</a:t>
             </a:fld>
             <a:endParaRPr lang="en-US"/>
           </a:p>
@@ -1059,7 +1059,7 @@
             <a:fld id="{1D8BD707-D9CF-40AE-B4C6-C98DA3205C09}" type="datetimeFigureOut">
               <a:rPr lang="en-US" smtClean="0"/>
               <a:pPr/>
-              <a:t>9/21/2017</a:t>
+              <a:t>31-Dec-17</a:t>
             </a:fld>
             <a:endParaRPr lang="en-US"/>
           </a:p>
@@ -1344,7 +1344,7 @@
             <a:fld id="{1D8BD707-D9CF-40AE-B4C6-C98DA3205C09}" type="datetimeFigureOut">
               <a:rPr lang="en-US" smtClean="0"/>
               <a:pPr/>
-              <a:t>9/21/2017</a:t>
+              <a:t>31-Dec-17</a:t>
             </a:fld>
             <a:endParaRPr lang="en-US"/>
           </a:p>
@@ -1763,7 +1763,7 @@
             <a:fld id="{1D8BD707-D9CF-40AE-B4C6-C98DA3205C09}" type="datetimeFigureOut">
               <a:rPr lang="en-US" smtClean="0"/>
               <a:pPr/>
-              <a:t>9/21/2017</a:t>
+              <a:t>31-Dec-17</a:t>
             </a:fld>
             <a:endParaRPr lang="en-US"/>
           </a:p>
@@ -1878,7 +1878,7 @@
             <a:fld id="{1D8BD707-D9CF-40AE-B4C6-C98DA3205C09}" type="datetimeFigureOut">
               <a:rPr lang="en-US" smtClean="0"/>
               <a:pPr/>
-              <a:t>9/21/2017</a:t>
+              <a:t>31-Dec-17</a:t>
             </a:fld>
             <a:endParaRPr lang="en-US"/>
           </a:p>
@@ -1970,7 +1970,7 @@
             <a:fld id="{1D8BD707-D9CF-40AE-B4C6-C98DA3205C09}" type="datetimeFigureOut">
               <a:rPr lang="en-US" smtClean="0"/>
               <a:pPr/>
-              <a:t>9/21/2017</a:t>
+              <a:t>31-Dec-17</a:t>
             </a:fld>
             <a:endParaRPr lang="en-US"/>
           </a:p>
@@ -2244,7 +2244,7 @@
             <a:fld id="{1D8BD707-D9CF-40AE-B4C6-C98DA3205C09}" type="datetimeFigureOut">
               <a:rPr lang="en-US" smtClean="0"/>
               <a:pPr/>
-              <a:t>9/21/2017</a:t>
+              <a:t>31-Dec-17</a:t>
             </a:fld>
             <a:endParaRPr lang="en-US"/>
           </a:p>
@@ -2494,7 +2494,7 @@
             <a:fld id="{1D8BD707-D9CF-40AE-B4C6-C98DA3205C09}" type="datetimeFigureOut">
               <a:rPr lang="en-US" smtClean="0"/>
               <a:pPr/>
-              <a:t>9/21/2017</a:t>
+              <a:t>31-Dec-17</a:t>
             </a:fld>
             <a:endParaRPr lang="en-US"/>
           </a:p>
@@ -2704,7 +2704,7 @@
             <a:fld id="{1D8BD707-D9CF-40AE-B4C6-C98DA3205C09}" type="datetimeFigureOut">
               <a:rPr lang="en-US" smtClean="0"/>
               <a:pPr/>
-              <a:t>9/21/2017</a:t>
+              <a:t>31-Dec-17</a:t>
             </a:fld>
             <a:endParaRPr lang="en-US"/>
           </a:p>
@@ -3460,7 +3460,7 @@
       </p:graphicFrame>
       <p:sp>
         <p:nvSpPr>
-          <p:cNvPr id="5" name="Folded Corner 4"/>
+          <p:cNvPr id="6" name="Rounded Rectangle 5"/>
           <p:cNvSpPr>
             <a:spLocks noChangeAspect="1"/>
           </p:cNvSpPr>
@@ -3468,22 +3468,19 @@
         </p:nvSpPr>
         <p:spPr>
           <a:xfrm>
-            <a:off x="4545366" y="4347822"/>
-            <a:ext cx="299490" cy="171750"/>
+            <a:off x="4884131" y="4027950"/>
+            <a:ext cx="426108" cy="340072"/>
           </a:xfrm>
-          <a:prstGeom prst="foldedCorner">
+          <a:prstGeom prst="roundRect">
             <a:avLst/>
           </a:prstGeom>
           <a:solidFill>
-            <a:schemeClr val="accent2">
-              <a:lumMod val="60000"/>
-              <a:lumOff val="40000"/>
+            <a:schemeClr val="accent6">
+              <a:lumMod val="75000"/>
             </a:schemeClr>
           </a:solidFill>
           <a:ln w="3175">
-            <a:solidFill>
-              <a:srgbClr val="C00000"/>
-            </a:solidFill>
+            <a:noFill/>
           </a:ln>
         </p:spPr>
         <p:style>
@@ -3509,7 +3506,7 @@
             <a:pPr algn="ctr"/>
             <a:r>
               <a:rPr lang="en-US" sz="900" dirty="0" smtClean="0"/>
-              <a:t>v1.0</a:t>
+              <a:t>v1.1</a:t>
             </a:r>
             <a:endParaRPr lang="en-SG" sz="900" dirty="0"/>
           </a:p>
@@ -3517,7 +3514,7 @@
       </p:sp>
       <p:sp>
         <p:nvSpPr>
-          <p:cNvPr id="6" name="Rounded Rectangle 5"/>
+          <p:cNvPr id="7" name="Rounded Rectangle 6"/>
           <p:cNvSpPr>
             <a:spLocks noChangeAspect="1"/>
           </p:cNvSpPr>
@@ -3525,22 +3522,19 @@
         </p:nvSpPr>
         <p:spPr>
           <a:xfrm>
-            <a:off x="5048539" y="4027950"/>
-            <a:ext cx="329439" cy="188925"/>
+            <a:off x="5349514" y="4018503"/>
+            <a:ext cx="468719" cy="374080"/>
           </a:xfrm>
           <a:prstGeom prst="roundRect">
             <a:avLst/>
           </a:prstGeom>
           <a:solidFill>
-            <a:schemeClr val="accent2">
-              <a:lumMod val="60000"/>
-              <a:lumOff val="40000"/>
+            <a:schemeClr val="accent6">
+              <a:lumMod val="75000"/>
             </a:schemeClr>
           </a:solidFill>
           <a:ln w="3175">
-            <a:solidFill>
-              <a:srgbClr val="C00000"/>
-            </a:solidFill>
+            <a:noFill/>
           </a:ln>
         </p:spPr>
         <p:style>
@@ -3565,16 +3559,16 @@
           <a:p>
             <a:pPr algn="ctr"/>
             <a:r>
-              <a:rPr lang="en-US" sz="900" dirty="0" smtClean="0"/>
-              <a:t>v1.1</a:t>
-            </a:r>
-            <a:endParaRPr lang="en-SG" sz="900" dirty="0"/>
-          </a:p>
-        </p:txBody>
-      </p:sp>
-      <p:sp>
-        <p:nvSpPr>
-          <p:cNvPr id="7" name="Rounded Rectangle 6"/>
+              <a:rPr lang="en-US" sz="1000" dirty="0" smtClean="0"/>
+              <a:t>v1.2</a:t>
+            </a:r>
+            <a:endParaRPr lang="en-SG" sz="1000" dirty="0"/>
+          </a:p>
+        </p:txBody>
+      </p:sp>
+      <p:sp>
+        <p:nvSpPr>
+          <p:cNvPr id="8" name="Rounded Rectangle 7"/>
           <p:cNvSpPr>
             <a:spLocks noChangeAspect="1"/>
           </p:cNvSpPr>
@@ -3582,22 +3576,19 @@
         </p:nvSpPr>
         <p:spPr>
           <a:xfrm>
-            <a:off x="5554097" y="4018503"/>
-            <a:ext cx="362383" cy="207818"/>
+            <a:off x="5857508" y="4008112"/>
+            <a:ext cx="515590" cy="411488"/>
           </a:xfrm>
           <a:prstGeom prst="roundRect">
             <a:avLst/>
           </a:prstGeom>
           <a:solidFill>
-            <a:schemeClr val="accent2">
-              <a:lumMod val="60000"/>
-              <a:lumOff val="40000"/>
+            <a:schemeClr val="accent6">
+              <a:lumMod val="75000"/>
             </a:schemeClr>
           </a:solidFill>
           <a:ln w="3175">
-            <a:solidFill>
-              <a:srgbClr val="C00000"/>
-            </a:solidFill>
+            <a:noFill/>
           </a:ln>
         </p:spPr>
         <p:style>
@@ -3622,16 +3613,16 @@
           <a:p>
             <a:pPr algn="ctr"/>
             <a:r>
-              <a:rPr lang="en-US" sz="900" dirty="0" smtClean="0"/>
-              <a:t>v1.2</a:t>
-            </a:r>
-            <a:endParaRPr lang="en-SG" sz="900" dirty="0"/>
-          </a:p>
-        </p:txBody>
-      </p:sp>
-      <p:sp>
-        <p:nvSpPr>
-          <p:cNvPr id="8" name="Rounded Rectangle 7"/>
+              <a:rPr lang="en-US" sz="1050" dirty="0" smtClean="0"/>
+              <a:t>v1.3</a:t>
+            </a:r>
+            <a:endParaRPr lang="en-SG" sz="1050" dirty="0"/>
+          </a:p>
+        </p:txBody>
+      </p:sp>
+      <p:sp>
+        <p:nvSpPr>
+          <p:cNvPr id="9" name="Rounded Rectangle 8"/>
           <p:cNvSpPr>
             <a:spLocks noChangeAspect="1"/>
           </p:cNvSpPr>
@@ -3639,22 +3630,19 @@
         </p:nvSpPr>
         <p:spPr>
           <a:xfrm>
-            <a:off x="6060569" y="4008112"/>
-            <a:ext cx="398621" cy="228600"/>
+            <a:off x="6412373" y="3996681"/>
+            <a:ext cx="567149" cy="452637"/>
           </a:xfrm>
           <a:prstGeom prst="roundRect">
             <a:avLst/>
           </a:prstGeom>
           <a:solidFill>
-            <a:schemeClr val="accent2">
-              <a:lumMod val="60000"/>
-              <a:lumOff val="40000"/>
+            <a:schemeClr val="accent6">
+              <a:lumMod val="75000"/>
             </a:schemeClr>
           </a:solidFill>
           <a:ln w="3175">
-            <a:solidFill>
-              <a:srgbClr val="C00000"/>
-            </a:solidFill>
+            <a:noFill/>
           </a:ln>
         </p:spPr>
         <p:style>
@@ -3679,16 +3667,16 @@
           <a:p>
             <a:pPr algn="ctr"/>
             <a:r>
-              <a:rPr lang="en-US" sz="900" dirty="0" smtClean="0"/>
-              <a:t>v1.3</a:t>
-            </a:r>
-            <a:endParaRPr lang="en-SG" sz="900" dirty="0"/>
-          </a:p>
-        </p:txBody>
-      </p:sp>
-      <p:sp>
-        <p:nvSpPr>
-          <p:cNvPr id="9" name="Rounded Rectangle 8"/>
+              <a:rPr lang="en-US" sz="1100" dirty="0" smtClean="0"/>
+              <a:t>v1.4</a:t>
+            </a:r>
+            <a:endParaRPr lang="en-SG" sz="1100" dirty="0"/>
+          </a:p>
+        </p:txBody>
+      </p:sp>
+      <p:sp>
+        <p:nvSpPr>
+          <p:cNvPr id="10" name="Rounded Rectangle 9"/>
           <p:cNvSpPr>
             <a:spLocks noChangeAspect="1"/>
           </p:cNvSpPr>
@@ -3696,22 +3684,19 @@
         </p:nvSpPr>
         <p:spPr>
           <a:xfrm>
-            <a:off x="6541057" y="3996682"/>
-            <a:ext cx="438483" cy="251460"/>
+            <a:off x="7018798" y="3984108"/>
+            <a:ext cx="623863" cy="497900"/>
           </a:xfrm>
           <a:prstGeom prst="roundRect">
             <a:avLst/>
           </a:prstGeom>
           <a:solidFill>
-            <a:schemeClr val="accent2">
-              <a:lumMod val="60000"/>
-              <a:lumOff val="40000"/>
+            <a:schemeClr val="accent6">
+              <a:lumMod val="75000"/>
             </a:schemeClr>
           </a:solidFill>
           <a:ln w="3175">
-            <a:solidFill>
-              <a:srgbClr val="C00000"/>
-            </a:solidFill>
+            <a:noFill/>
           </a:ln>
         </p:spPr>
         <p:style>
@@ -3736,16 +3721,16 @@
           <a:p>
             <a:pPr algn="ctr"/>
             <a:r>
-              <a:rPr lang="en-US" sz="900" dirty="0" smtClean="0"/>
-              <a:t>v1.4</a:t>
-            </a:r>
-            <a:endParaRPr lang="en-SG" sz="900" dirty="0"/>
-          </a:p>
-        </p:txBody>
-      </p:sp>
-      <p:sp>
-        <p:nvSpPr>
-          <p:cNvPr id="10" name="Rounded Rectangle 9"/>
+              <a:rPr lang="en-US" sz="1200" dirty="0" smtClean="0"/>
+              <a:t>v1.5rc</a:t>
+            </a:r>
+            <a:endParaRPr lang="en-SG" sz="1200" dirty="0"/>
+          </a:p>
+        </p:txBody>
+      </p:sp>
+      <p:sp>
+        <p:nvSpPr>
+          <p:cNvPr id="11" name="Rounded Rectangle 10"/>
           <p:cNvSpPr>
             <a:spLocks noChangeAspect="1"/>
           </p:cNvSpPr>
@@ -3753,22 +3738,19 @@
         </p:nvSpPr>
         <p:spPr>
           <a:xfrm>
-            <a:off x="7053862" y="3984109"/>
-            <a:ext cx="482331" cy="276606"/>
+            <a:off x="7681937" y="3984107"/>
+            <a:ext cx="623863" cy="521631"/>
           </a:xfrm>
           <a:prstGeom prst="roundRect">
             <a:avLst/>
           </a:prstGeom>
           <a:solidFill>
-            <a:schemeClr val="accent2">
-              <a:lumMod val="60000"/>
-              <a:lumOff val="40000"/>
+            <a:schemeClr val="accent6">
+              <a:lumMod val="75000"/>
             </a:schemeClr>
           </a:solidFill>
           <a:ln w="3175">
-            <a:solidFill>
-              <a:srgbClr val="C00000"/>
-            </a:solidFill>
+            <a:noFill/>
           </a:ln>
         </p:spPr>
         <p:style>
@@ -3793,16 +3775,16 @@
           <a:p>
             <a:pPr algn="ctr"/>
             <a:r>
-              <a:rPr lang="en-US" sz="900" dirty="0" smtClean="0"/>
-              <a:t>v1.5rc</a:t>
-            </a:r>
-            <a:endParaRPr lang="en-SG" sz="900" dirty="0"/>
-          </a:p>
-        </p:txBody>
-      </p:sp>
-      <p:sp>
-        <p:nvSpPr>
-          <p:cNvPr id="11" name="Rounded Rectangle 10"/>
+              <a:rPr lang="en-US" sz="1400" dirty="0" smtClean="0"/>
+              <a:t>v1.5</a:t>
+            </a:r>
+            <a:endParaRPr lang="en-SG" sz="1400" dirty="0"/>
+          </a:p>
+        </p:txBody>
+      </p:sp>
+      <p:sp>
+        <p:nvSpPr>
+          <p:cNvPr id="14" name="Rounded Rectangle 13"/>
           <p:cNvSpPr>
             <a:spLocks noChangeAspect="1"/>
           </p:cNvSpPr>
@@ -3810,22 +3792,19 @@
         </p:nvSpPr>
         <p:spPr>
           <a:xfrm>
-            <a:off x="7594869" y="3984109"/>
-            <a:ext cx="482331" cy="276606"/>
+            <a:off x="4457484" y="4036536"/>
+            <a:ext cx="387371" cy="309156"/>
           </a:xfrm>
           <a:prstGeom prst="roundRect">
             <a:avLst/>
           </a:prstGeom>
           <a:solidFill>
-            <a:schemeClr val="accent2">
-              <a:lumMod val="60000"/>
-              <a:lumOff val="40000"/>
+            <a:schemeClr val="accent6">
+              <a:lumMod val="75000"/>
             </a:schemeClr>
           </a:solidFill>
           <a:ln w="3175">
-            <a:solidFill>
-              <a:srgbClr val="C00000"/>
-            </a:solidFill>
+            <a:noFill/>
           </a:ln>
         </p:spPr>
         <p:style>
@@ -3850,8 +3829,8 @@
           <a:p>
             <a:pPr algn="ctr"/>
             <a:r>
-              <a:rPr lang="en-US" sz="900" dirty="0" smtClean="0"/>
-              <a:t>v1.5</a:t>
+              <a:rPr lang="en-SG" sz="900" dirty="0" smtClean="0"/>
+              <a:t>V1.0</a:t>
             </a:r>
             <a:endParaRPr lang="en-SG" sz="900" dirty="0"/>
           </a:p>
@@ -3859,7 +3838,7 @@
       </p:sp>
       <p:sp>
         <p:nvSpPr>
-          <p:cNvPr id="12" name="Folded Corner 11"/>
+          <p:cNvPr id="15" name="Rounded Rectangle 14"/>
           <p:cNvSpPr>
             <a:spLocks noChangeAspect="1"/>
           </p:cNvSpPr>
@@ -3867,163 +3846,8 @@
         </p:nvSpPr>
         <p:spPr>
           <a:xfrm>
-            <a:off x="6060569" y="4319397"/>
-            <a:ext cx="398621" cy="228600"/>
-          </a:xfrm>
-          <a:prstGeom prst="foldedCorner">
-            <a:avLst/>
-          </a:prstGeom>
-          <a:solidFill>
-            <a:schemeClr val="accent2">
-              <a:lumMod val="60000"/>
-              <a:lumOff val="40000"/>
-            </a:schemeClr>
-          </a:solidFill>
-          <a:ln w="3175">
-            <a:solidFill>
-              <a:srgbClr val="C00000"/>
-            </a:solidFill>
-          </a:ln>
-        </p:spPr>
-        <p:style>
-          <a:lnRef idx="2">
-            <a:schemeClr val="accent1">
-              <a:shade val="50000"/>
-            </a:schemeClr>
-          </a:lnRef>
-          <a:fillRef idx="1">
-            <a:schemeClr val="accent1"/>
-          </a:fillRef>
-          <a:effectRef idx="0">
-            <a:schemeClr val="accent1"/>
-          </a:effectRef>
-          <a:fontRef idx="minor">
-            <a:schemeClr val="lt1"/>
-          </a:fontRef>
-        </p:style>
-        <p:txBody>
-          <a:bodyPr lIns="0" tIns="0" rIns="0" bIns="0" rtlCol="0" anchor="ctr"/>
-          <a:lstStyle/>
-          <a:p>
-            <a:pPr algn="ctr"/>
-            <a:endParaRPr lang="en-SG" sz="900" dirty="0"/>
-          </a:p>
-        </p:txBody>
-      </p:sp>
-      <p:sp>
-        <p:nvSpPr>
-          <p:cNvPr id="13" name="Folded Corner 12"/>
-          <p:cNvSpPr>
-            <a:spLocks noChangeAspect="1"/>
-          </p:cNvSpPr>
-          <p:nvPr/>
-        </p:nvSpPr>
-        <p:spPr>
-          <a:xfrm>
-            <a:off x="7594869" y="4313150"/>
-            <a:ext cx="482331" cy="276606"/>
-          </a:xfrm>
-          <a:prstGeom prst="foldedCorner">
-            <a:avLst/>
-          </a:prstGeom>
-          <a:solidFill>
-            <a:schemeClr val="accent2">
-              <a:lumMod val="60000"/>
-              <a:lumOff val="40000"/>
-            </a:schemeClr>
-          </a:solidFill>
-          <a:ln w="3175">
-            <a:solidFill>
-              <a:srgbClr val="C00000"/>
-            </a:solidFill>
-          </a:ln>
-        </p:spPr>
-        <p:style>
-          <a:lnRef idx="2">
-            <a:schemeClr val="accent1">
-              <a:shade val="50000"/>
-            </a:schemeClr>
-          </a:lnRef>
-          <a:fillRef idx="1">
-            <a:schemeClr val="accent1"/>
-          </a:fillRef>
-          <a:effectRef idx="0">
-            <a:schemeClr val="accent1"/>
-          </a:effectRef>
-          <a:fontRef idx="minor">
-            <a:schemeClr val="lt1"/>
-          </a:fontRef>
-        </p:style>
-        <p:txBody>
-          <a:bodyPr lIns="0" tIns="0" rIns="0" bIns="0" rtlCol="0" anchor="ctr"/>
-          <a:lstStyle/>
-          <a:p>
-            <a:pPr algn="ctr"/>
-            <a:endParaRPr lang="en-SG" sz="900" dirty="0"/>
-          </a:p>
-        </p:txBody>
-      </p:sp>
-      <p:sp>
-        <p:nvSpPr>
-          <p:cNvPr id="14" name="Rounded Rectangle 13"/>
-          <p:cNvSpPr>
-            <a:spLocks noChangeAspect="1"/>
-          </p:cNvSpPr>
-          <p:nvPr/>
-        </p:nvSpPr>
-        <p:spPr>
-          <a:xfrm>
-            <a:off x="4545365" y="4036537"/>
-            <a:ext cx="299490" cy="171750"/>
-          </a:xfrm>
-          <a:prstGeom prst="roundRect">
-            <a:avLst/>
-          </a:prstGeom>
-          <a:noFill/>
-          <a:ln w="3175">
-            <a:solidFill>
-              <a:srgbClr val="C00000"/>
-            </a:solidFill>
-            <a:prstDash val="sysDot"/>
-          </a:ln>
-        </p:spPr>
-        <p:style>
-          <a:lnRef idx="2">
-            <a:schemeClr val="accent1">
-              <a:shade val="50000"/>
-            </a:schemeClr>
-          </a:lnRef>
-          <a:fillRef idx="1">
-            <a:schemeClr val="accent1"/>
-          </a:fillRef>
-          <a:effectRef idx="0">
-            <a:schemeClr val="accent1"/>
-          </a:effectRef>
-          <a:fontRef idx="minor">
-            <a:schemeClr val="lt1"/>
-          </a:fontRef>
-        </p:style>
-        <p:txBody>
-          <a:bodyPr lIns="0" tIns="0" rIns="0" bIns="0" rtlCol="0" anchor="ctr"/>
-          <a:lstStyle/>
-          <a:p>
-            <a:pPr algn="ctr"/>
-            <a:endParaRPr lang="en-SG" sz="900" dirty="0"/>
-          </a:p>
-        </p:txBody>
-      </p:sp>
-      <p:sp>
-        <p:nvSpPr>
-          <p:cNvPr id="15" name="Rounded Rectangle 14"/>
-          <p:cNvSpPr>
-            <a:spLocks noChangeAspect="1"/>
-          </p:cNvSpPr>
-          <p:nvPr/>
-        </p:nvSpPr>
-        <p:spPr>
-          <a:xfrm>
-            <a:off x="475319" y="2753591"/>
-            <a:ext cx="362383" cy="207818"/>
+            <a:off x="458071" y="4066275"/>
+            <a:ext cx="303929" cy="207818"/>
           </a:xfrm>
           <a:prstGeom prst="roundRect">
             <a:avLst/>
@@ -4060,7 +3884,7 @@
             <a:pPr algn="ctr"/>
             <a:r>
               <a:rPr lang="en-US" sz="900" dirty="0" smtClean="0"/>
-              <a:t>AB-1</a:t>
+              <a:t>AB1</a:t>
             </a:r>
             <a:endParaRPr lang="en-SG" sz="900" dirty="0"/>
           </a:p>
@@ -4076,8 +3900,8 @@
         </p:nvSpPr>
         <p:spPr>
           <a:xfrm>
-            <a:off x="1869710" y="2731770"/>
-            <a:ext cx="438483" cy="251460"/>
+            <a:off x="1852463" y="4044454"/>
+            <a:ext cx="357338" cy="251460"/>
           </a:xfrm>
           <a:prstGeom prst="roundRect">
             <a:avLst/>
@@ -4114,7 +3938,7 @@
             <a:pPr algn="ctr"/>
             <a:r>
               <a:rPr lang="en-US" sz="900" dirty="0" smtClean="0"/>
-              <a:t>AB-2</a:t>
+              <a:t>AB2</a:t>
             </a:r>
             <a:endParaRPr lang="en-SG" sz="900" dirty="0"/>
           </a:p>
@@ -4130,8 +3954,8 @@
         </p:nvSpPr>
         <p:spPr>
           <a:xfrm>
-            <a:off x="2879289" y="2705367"/>
-            <a:ext cx="530564" cy="304267"/>
+            <a:off x="2908082" y="4044454"/>
+            <a:ext cx="414871" cy="251460"/>
           </a:xfrm>
           <a:prstGeom prst="roundRect">
             <a:avLst/>
@@ -4167,10 +3991,10 @@
           <a:p>
             <a:pPr algn="ctr"/>
             <a:r>
-              <a:rPr lang="en-US" sz="900" dirty="0" smtClean="0"/>
-              <a:t>AB-3</a:t>
-            </a:r>
-            <a:endParaRPr lang="en-SG" sz="900" dirty="0"/>
+              <a:rPr lang="en-US" sz="1050" dirty="0" smtClean="0"/>
+              <a:t>AB3</a:t>
+            </a:r>
+            <a:endParaRPr lang="en-SG" sz="1050" dirty="0"/>
           </a:p>
         </p:txBody>
       </p:sp>
@@ -4184,8 +4008,8 @@
         </p:nvSpPr>
         <p:spPr>
           <a:xfrm>
-            <a:off x="3581400" y="2673419"/>
-            <a:ext cx="641982" cy="368163"/>
+            <a:off x="3619861" y="4018051"/>
+            <a:ext cx="418739" cy="277863"/>
           </a:xfrm>
           <a:prstGeom prst="roundRect">
             <a:avLst/>
@@ -4221,10 +4045,10 @@
           <a:p>
             <a:pPr algn="ctr"/>
             <a:r>
-              <a:rPr lang="en-US" sz="900" dirty="0" smtClean="0"/>
-              <a:t>AB-4</a:t>
-            </a:r>
-            <a:endParaRPr lang="en-SG" sz="900" dirty="0"/>
+              <a:rPr lang="en-US" sz="1200" dirty="0" smtClean="0"/>
+              <a:t>AB4</a:t>
+            </a:r>
+            <a:endParaRPr lang="en-SG" sz="1200" dirty="0"/>
           </a:p>
         </p:txBody>
       </p:sp>
@@ -4243,9 +4067,65 @@
             <a:avLst/>
           </a:prstGeom>
           <a:solidFill>
-            <a:schemeClr val="accent5">
-              <a:lumMod val="60000"/>
-              <a:lumOff val="40000"/>
+            <a:srgbClr val="00B050"/>
+          </a:solidFill>
+          <a:ln w="12700">
+            <a:solidFill>
+              <a:schemeClr val="bg1"/>
+            </a:solidFill>
+          </a:ln>
+        </p:spPr>
+        <p:style>
+          <a:lnRef idx="2">
+            <a:schemeClr val="accent1">
+              <a:shade val="50000"/>
+            </a:schemeClr>
+          </a:lnRef>
+          <a:fillRef idx="1">
+            <a:schemeClr val="accent1"/>
+          </a:fillRef>
+          <a:effectRef idx="0">
+            <a:schemeClr val="accent1"/>
+          </a:effectRef>
+          <a:fontRef idx="minor">
+            <a:schemeClr val="lt1"/>
+          </a:fontRef>
+        </p:style>
+        <p:txBody>
+          <a:bodyPr rot="0" spcFirstLastPara="0" vertOverflow="overflow" horzOverflow="overflow" vert="horz" wrap="square" lIns="0" tIns="0" rIns="0" bIns="0" numCol="1" spcCol="0" rtlCol="0" fromWordArt="0" anchor="ctr" anchorCtr="0" forceAA="0" compatLnSpc="1">
+            <a:prstTxWarp prst="textNoShape">
+              <a:avLst/>
+            </a:prstTxWarp>
+            <a:noAutofit/>
+          </a:bodyPr>
+          <a:lstStyle/>
+          <a:p>
+            <a:pPr algn="ctr"/>
+            <a:r>
+              <a:rPr lang="en-US" sz="900" dirty="0"/>
+              <a:t>Phase A</a:t>
+            </a:r>
+            <a:endParaRPr lang="en-SG" sz="900" dirty="0"/>
+          </a:p>
+        </p:txBody>
+      </p:sp>
+      <p:sp>
+        <p:nvSpPr>
+          <p:cNvPr id="20" name="Rectangle 45"/>
+          <p:cNvSpPr/>
+          <p:nvPr/>
+        </p:nvSpPr>
+        <p:spPr>
+          <a:xfrm>
+            <a:off x="3276600" y="3567030"/>
+            <a:ext cx="5486400" cy="237883"/>
+          </a:xfrm>
+          <a:prstGeom prst="rect">
+            <a:avLst/>
+          </a:prstGeom>
+          <a:solidFill>
+            <a:schemeClr val="accent6">
+              <a:lumMod val="75000"/>
             </a:schemeClr>
           </a:solidFill>
           <a:ln w="12700">
@@ -4282,66 +4162,6 @@
             <a:pPr algn="ctr"/>
             <a:r>
               <a:rPr lang="en-US" sz="900" dirty="0"/>
-              <a:t>Phase A</a:t>
-            </a:r>
-            <a:endParaRPr lang="en-SG" sz="900" dirty="0"/>
-          </a:p>
-        </p:txBody>
-      </p:sp>
-      <p:sp>
-        <p:nvSpPr>
-          <p:cNvPr id="20" name="Rectangle 45"/>
-          <p:cNvSpPr/>
-          <p:nvPr/>
-        </p:nvSpPr>
-        <p:spPr>
-          <a:xfrm>
-            <a:off x="3276600" y="3567030"/>
-            <a:ext cx="5486400" cy="237883"/>
-          </a:xfrm>
-          <a:prstGeom prst="rect">
-            <a:avLst/>
-          </a:prstGeom>
-          <a:solidFill>
-            <a:schemeClr val="accent2">
-              <a:lumMod val="40000"/>
-              <a:lumOff val="60000"/>
-            </a:schemeClr>
-          </a:solidFill>
-          <a:ln w="12700">
-            <a:solidFill>
-              <a:schemeClr val="bg1"/>
-            </a:solidFill>
-          </a:ln>
-        </p:spPr>
-        <p:style>
-          <a:lnRef idx="2">
-            <a:schemeClr val="accent1">
-              <a:shade val="50000"/>
-            </a:schemeClr>
-          </a:lnRef>
-          <a:fillRef idx="1">
-            <a:schemeClr val="accent1"/>
-          </a:fillRef>
-          <a:effectRef idx="0">
-            <a:schemeClr val="accent1"/>
-          </a:effectRef>
-          <a:fontRef idx="minor">
-            <a:schemeClr val="lt1"/>
-          </a:fontRef>
-        </p:style>
-        <p:txBody>
-          <a:bodyPr rot="0" spcFirstLastPara="0" vertOverflow="overflow" horzOverflow="overflow" vert="horz" wrap="square" lIns="0" tIns="0" rIns="0" bIns="0" numCol="1" spcCol="0" rtlCol="0" fromWordArt="0" anchor="ctr" anchorCtr="0" forceAA="0" compatLnSpc="1">
-            <a:prstTxWarp prst="textNoShape">
-              <a:avLst/>
-            </a:prstTxWarp>
-            <a:noAutofit/>
-          </a:bodyPr>
-          <a:lstStyle/>
-          <a:p>
-            <a:pPr algn="ctr"/>
-            <a:r>
-              <a:rPr lang="en-US" sz="900" dirty="0"/>
               <a:t>Phase </a:t>
             </a:r>
             <a:r>
@@ -4352,557 +4172,6 @@
           </a:p>
         </p:txBody>
       </p:sp>
-      <p:sp>
-        <p:nvSpPr>
-          <p:cNvPr id="21" name="TextBox 20"/>
-          <p:cNvSpPr txBox="1"/>
-          <p:nvPr/>
-        </p:nvSpPr>
-        <p:spPr>
-          <a:xfrm>
-            <a:off x="5096482" y="2743200"/>
-            <a:ext cx="2066318" cy="261610"/>
-          </a:xfrm>
-          <a:prstGeom prst="rect">
-            <a:avLst/>
-          </a:prstGeom>
-          <a:noFill/>
-        </p:spPr>
-        <p:txBody>
-          <a:bodyPr wrap="square" rtlCol="0">
-            <a:spAutoFit/>
-          </a:bodyPr>
-          <a:lstStyle/>
-          <a:p>
-            <a:r>
-              <a:rPr lang="en-US" sz="1050" b="1" dirty="0" smtClean="0">
-                <a:solidFill>
-                  <a:srgbClr val="00B050"/>
-                </a:solidFill>
-              </a:rPr>
-              <a:t>Starter code releases</a:t>
-            </a:r>
-            <a:endParaRPr lang="en-SG" sz="1050" b="1" dirty="0">
-              <a:solidFill>
-                <a:srgbClr val="00B050"/>
-              </a:solidFill>
-            </a:endParaRPr>
-          </a:p>
-        </p:txBody>
-      </p:sp>
-      <p:sp>
-        <p:nvSpPr>
-          <p:cNvPr id="22" name="TextBox 21"/>
-          <p:cNvSpPr txBox="1"/>
-          <p:nvPr/>
-        </p:nvSpPr>
-        <p:spPr>
-          <a:xfrm>
-            <a:off x="3276600" y="4056299"/>
-            <a:ext cx="914400" cy="415498"/>
-          </a:xfrm>
-          <a:prstGeom prst="rect">
-            <a:avLst/>
-          </a:prstGeom>
-          <a:noFill/>
-        </p:spPr>
-        <p:txBody>
-          <a:bodyPr wrap="square" rtlCol="0">
-            <a:spAutoFit/>
-          </a:bodyPr>
-          <a:lstStyle/>
-          <a:p>
-            <a:pPr algn="r"/>
-            <a:r>
-              <a:rPr lang="en-US" sz="1050" b="1" dirty="0" smtClean="0">
-                <a:solidFill>
-                  <a:srgbClr val="C00000"/>
-                </a:solidFill>
-              </a:rPr>
-              <a:t>Product releases</a:t>
-            </a:r>
-            <a:endParaRPr lang="en-SG" sz="1050" b="1" dirty="0">
-              <a:solidFill>
-                <a:srgbClr val="C00000"/>
-              </a:solidFill>
-            </a:endParaRPr>
-          </a:p>
-        </p:txBody>
-      </p:sp>
-      <p:cxnSp>
-        <p:nvCxnSpPr>
-          <p:cNvPr id="23" name="Straight Connector 22"/>
-          <p:cNvCxnSpPr>
-            <a:stCxn id="8" idx="2"/>
-            <a:endCxn id="12" idx="0"/>
-          </p:cNvCxnSpPr>
-          <p:nvPr/>
-        </p:nvCxnSpPr>
-        <p:spPr>
-          <a:xfrm>
-            <a:off x="6259880" y="4236712"/>
-            <a:ext cx="0" cy="82685"/>
-          </a:xfrm>
-          <a:prstGeom prst="line">
-            <a:avLst/>
-          </a:prstGeom>
-          <a:ln>
-            <a:solidFill>
-              <a:srgbClr val="C00000"/>
-            </a:solidFill>
-          </a:ln>
-        </p:spPr>
-        <p:style>
-          <a:lnRef idx="1">
-            <a:schemeClr val="accent1"/>
-          </a:lnRef>
-          <a:fillRef idx="0">
-            <a:schemeClr val="accent1"/>
-          </a:fillRef>
-          <a:effectRef idx="0">
-            <a:schemeClr val="accent1"/>
-          </a:effectRef>
-          <a:fontRef idx="minor">
-            <a:schemeClr val="tx1"/>
-          </a:fontRef>
-        </p:style>
-      </p:cxnSp>
-      <p:cxnSp>
-        <p:nvCxnSpPr>
-          <p:cNvPr id="24" name="Straight Connector 23"/>
-          <p:cNvCxnSpPr>
-            <a:stCxn id="11" idx="2"/>
-            <a:endCxn id="13" idx="0"/>
-          </p:cNvCxnSpPr>
-          <p:nvPr/>
-        </p:nvCxnSpPr>
-        <p:spPr>
-          <a:xfrm>
-            <a:off x="7836035" y="4260715"/>
-            <a:ext cx="0" cy="52435"/>
-          </a:xfrm>
-          <a:prstGeom prst="line">
-            <a:avLst/>
-          </a:prstGeom>
-          <a:ln>
-            <a:solidFill>
-              <a:srgbClr val="C00000"/>
-            </a:solidFill>
-          </a:ln>
-        </p:spPr>
-        <p:style>
-          <a:lnRef idx="1">
-            <a:schemeClr val="accent1"/>
-          </a:lnRef>
-          <a:fillRef idx="0">
-            <a:schemeClr val="accent1"/>
-          </a:fillRef>
-          <a:effectRef idx="0">
-            <a:schemeClr val="accent1"/>
-          </a:effectRef>
-          <a:fontRef idx="minor">
-            <a:schemeClr val="tx1"/>
-          </a:fontRef>
-        </p:style>
-      </p:cxnSp>
-      <p:cxnSp>
-        <p:nvCxnSpPr>
-          <p:cNvPr id="25" name="Straight Connector 24"/>
-          <p:cNvCxnSpPr>
-            <a:stCxn id="14" idx="2"/>
-            <a:endCxn id="5" idx="0"/>
-          </p:cNvCxnSpPr>
-          <p:nvPr/>
-        </p:nvCxnSpPr>
-        <p:spPr>
-          <a:xfrm>
-            <a:off x="4695110" y="4208287"/>
-            <a:ext cx="1" cy="139535"/>
-          </a:xfrm>
-          <a:prstGeom prst="line">
-            <a:avLst/>
-          </a:prstGeom>
-          <a:ln>
-            <a:solidFill>
-              <a:srgbClr val="C00000"/>
-            </a:solidFill>
-          </a:ln>
-        </p:spPr>
-        <p:style>
-          <a:lnRef idx="1">
-            <a:schemeClr val="accent1"/>
-          </a:lnRef>
-          <a:fillRef idx="0">
-            <a:schemeClr val="accent1"/>
-          </a:fillRef>
-          <a:effectRef idx="0">
-            <a:schemeClr val="accent1"/>
-          </a:effectRef>
-          <a:fontRef idx="minor">
-            <a:schemeClr val="tx1"/>
-          </a:fontRef>
-        </p:style>
-      </p:cxnSp>
-      <p:sp>
-        <p:nvSpPr>
-          <p:cNvPr id="26" name="Folded Corner 25"/>
-          <p:cNvSpPr>
-            <a:spLocks noChangeAspect="1"/>
-          </p:cNvSpPr>
-          <p:nvPr/>
-        </p:nvSpPr>
-        <p:spPr>
-          <a:xfrm>
-            <a:off x="5053543" y="4349656"/>
-            <a:ext cx="314768" cy="180512"/>
-          </a:xfrm>
-          <a:prstGeom prst="foldedCorner">
-            <a:avLst/>
-          </a:prstGeom>
-          <a:solidFill>
-            <a:schemeClr val="accent2">
-              <a:lumMod val="60000"/>
-              <a:lumOff val="40000"/>
-            </a:schemeClr>
-          </a:solidFill>
-          <a:ln w="3175">
-            <a:solidFill>
-              <a:srgbClr val="C00000"/>
-            </a:solidFill>
-          </a:ln>
-        </p:spPr>
-        <p:style>
-          <a:lnRef idx="2">
-            <a:schemeClr val="accent1">
-              <a:shade val="50000"/>
-            </a:schemeClr>
-          </a:lnRef>
-          <a:fillRef idx="1">
-            <a:schemeClr val="accent1"/>
-          </a:fillRef>
-          <a:effectRef idx="0">
-            <a:schemeClr val="accent1"/>
-          </a:effectRef>
-          <a:fontRef idx="minor">
-            <a:schemeClr val="lt1"/>
-          </a:fontRef>
-        </p:style>
-        <p:txBody>
-          <a:bodyPr lIns="0" tIns="0" rIns="0" bIns="0" rtlCol="0" anchor="ctr"/>
-          <a:lstStyle/>
-          <a:p>
-            <a:pPr algn="ctr"/>
-            <a:endParaRPr lang="en-SG" sz="900" dirty="0"/>
-          </a:p>
-        </p:txBody>
-      </p:sp>
-      <p:cxnSp>
-        <p:nvCxnSpPr>
-          <p:cNvPr id="27" name="Straight Connector 26"/>
-          <p:cNvCxnSpPr>
-            <a:endCxn id="26" idx="0"/>
-          </p:cNvCxnSpPr>
-          <p:nvPr/>
-        </p:nvCxnSpPr>
-        <p:spPr>
-          <a:xfrm>
-            <a:off x="5210926" y="4214502"/>
-            <a:ext cx="1" cy="135154"/>
-          </a:xfrm>
-          <a:prstGeom prst="line">
-            <a:avLst/>
-          </a:prstGeom>
-          <a:ln>
-            <a:solidFill>
-              <a:srgbClr val="C00000"/>
-            </a:solidFill>
-          </a:ln>
-        </p:spPr>
-        <p:style>
-          <a:lnRef idx="1">
-            <a:schemeClr val="accent1"/>
-          </a:lnRef>
-          <a:fillRef idx="0">
-            <a:schemeClr val="accent1"/>
-          </a:fillRef>
-          <a:effectRef idx="0">
-            <a:schemeClr val="accent1"/>
-          </a:effectRef>
-          <a:fontRef idx="minor">
-            <a:schemeClr val="tx1"/>
-          </a:fontRef>
-        </p:style>
-      </p:cxnSp>
-      <p:sp>
-        <p:nvSpPr>
-          <p:cNvPr id="28" name="Folded Corner 27"/>
-          <p:cNvSpPr>
-            <a:spLocks noChangeAspect="1"/>
-          </p:cNvSpPr>
-          <p:nvPr/>
-        </p:nvSpPr>
-        <p:spPr>
-          <a:xfrm>
-            <a:off x="5545990" y="4339654"/>
-            <a:ext cx="380870" cy="218419"/>
-          </a:xfrm>
-          <a:prstGeom prst="foldedCorner">
-            <a:avLst/>
-          </a:prstGeom>
-          <a:solidFill>
-            <a:schemeClr val="accent2">
-              <a:lumMod val="60000"/>
-              <a:lumOff val="40000"/>
-            </a:schemeClr>
-          </a:solidFill>
-          <a:ln w="3175">
-            <a:solidFill>
-              <a:srgbClr val="C00000"/>
-            </a:solidFill>
-          </a:ln>
-        </p:spPr>
-        <p:style>
-          <a:lnRef idx="2">
-            <a:schemeClr val="accent1">
-              <a:shade val="50000"/>
-            </a:schemeClr>
-          </a:lnRef>
-          <a:fillRef idx="1">
-            <a:schemeClr val="accent1"/>
-          </a:fillRef>
-          <a:effectRef idx="0">
-            <a:schemeClr val="accent1"/>
-          </a:effectRef>
-          <a:fontRef idx="minor">
-            <a:schemeClr val="lt1"/>
-          </a:fontRef>
-        </p:style>
-        <p:txBody>
-          <a:bodyPr lIns="0" tIns="0" rIns="0" bIns="0" rtlCol="0" anchor="ctr"/>
-          <a:lstStyle/>
-          <a:p>
-            <a:pPr algn="ctr"/>
-            <a:endParaRPr lang="en-SG" sz="900" dirty="0"/>
-          </a:p>
-        </p:txBody>
-      </p:sp>
-      <p:cxnSp>
-        <p:nvCxnSpPr>
-          <p:cNvPr id="29" name="Straight Connector 28"/>
-          <p:cNvCxnSpPr>
-            <a:endCxn id="28" idx="0"/>
-          </p:cNvCxnSpPr>
-          <p:nvPr/>
-        </p:nvCxnSpPr>
-        <p:spPr>
-          <a:xfrm>
-            <a:off x="5736424" y="4223453"/>
-            <a:ext cx="1" cy="116201"/>
-          </a:xfrm>
-          <a:prstGeom prst="line">
-            <a:avLst/>
-          </a:prstGeom>
-          <a:ln>
-            <a:solidFill>
-              <a:srgbClr val="C00000"/>
-            </a:solidFill>
-          </a:ln>
-        </p:spPr>
-        <p:style>
-          <a:lnRef idx="1">
-            <a:schemeClr val="accent1"/>
-          </a:lnRef>
-          <a:fillRef idx="0">
-            <a:schemeClr val="accent1"/>
-          </a:fillRef>
-          <a:effectRef idx="0">
-            <a:schemeClr val="accent1"/>
-          </a:effectRef>
-          <a:fontRef idx="minor">
-            <a:schemeClr val="tx1"/>
-          </a:fontRef>
-        </p:style>
-      </p:cxnSp>
-      <p:sp>
-        <p:nvSpPr>
-          <p:cNvPr id="30" name="Folded Corner 29"/>
-          <p:cNvSpPr>
-            <a:spLocks noChangeAspect="1"/>
-          </p:cNvSpPr>
-          <p:nvPr/>
-        </p:nvSpPr>
-        <p:spPr>
-          <a:xfrm>
-            <a:off x="6555515" y="4336191"/>
-            <a:ext cx="410699" cy="235527"/>
-          </a:xfrm>
-          <a:prstGeom prst="foldedCorner">
-            <a:avLst/>
-          </a:prstGeom>
-          <a:solidFill>
-            <a:schemeClr val="accent2">
-              <a:lumMod val="60000"/>
-              <a:lumOff val="40000"/>
-            </a:schemeClr>
-          </a:solidFill>
-          <a:ln w="3175">
-            <a:solidFill>
-              <a:srgbClr val="C00000"/>
-            </a:solidFill>
-          </a:ln>
-        </p:spPr>
-        <p:style>
-          <a:lnRef idx="2">
-            <a:schemeClr val="accent1">
-              <a:shade val="50000"/>
-            </a:schemeClr>
-          </a:lnRef>
-          <a:fillRef idx="1">
-            <a:schemeClr val="accent1"/>
-          </a:fillRef>
-          <a:effectRef idx="0">
-            <a:schemeClr val="accent1"/>
-          </a:effectRef>
-          <a:fontRef idx="minor">
-            <a:schemeClr val="lt1"/>
-          </a:fontRef>
-        </p:style>
-        <p:txBody>
-          <a:bodyPr lIns="0" tIns="0" rIns="0" bIns="0" rtlCol="0" anchor="ctr"/>
-          <a:lstStyle/>
-          <a:p>
-            <a:pPr algn="ctr"/>
-            <a:endParaRPr lang="en-SG" sz="900" dirty="0"/>
-          </a:p>
-        </p:txBody>
-      </p:sp>
-      <p:cxnSp>
-        <p:nvCxnSpPr>
-          <p:cNvPr id="31" name="Straight Connector 30"/>
-          <p:cNvCxnSpPr>
-            <a:endCxn id="30" idx="0"/>
-          </p:cNvCxnSpPr>
-          <p:nvPr/>
-        </p:nvCxnSpPr>
-        <p:spPr>
-          <a:xfrm>
-            <a:off x="6760865" y="4256969"/>
-            <a:ext cx="0" cy="79222"/>
-          </a:xfrm>
-          <a:prstGeom prst="line">
-            <a:avLst/>
-          </a:prstGeom>
-          <a:ln>
-            <a:solidFill>
-              <a:srgbClr val="C00000"/>
-            </a:solidFill>
-          </a:ln>
-        </p:spPr>
-        <p:style>
-          <a:lnRef idx="1">
-            <a:schemeClr val="accent1"/>
-          </a:lnRef>
-          <a:fillRef idx="0">
-            <a:schemeClr val="accent1"/>
-          </a:fillRef>
-          <a:effectRef idx="0">
-            <a:schemeClr val="accent1"/>
-          </a:effectRef>
-          <a:fontRef idx="minor">
-            <a:schemeClr val="tx1"/>
-          </a:fontRef>
-        </p:style>
-      </p:cxnSp>
-      <p:sp>
-        <p:nvSpPr>
-          <p:cNvPr id="32" name="Folded Corner 31"/>
-          <p:cNvSpPr>
-            <a:spLocks noChangeAspect="1"/>
-          </p:cNvSpPr>
-          <p:nvPr/>
-        </p:nvSpPr>
-        <p:spPr>
-          <a:xfrm>
-            <a:off x="7073951" y="4336392"/>
-            <a:ext cx="438483" cy="251460"/>
-          </a:xfrm>
-          <a:prstGeom prst="foldedCorner">
-            <a:avLst/>
-          </a:prstGeom>
-          <a:solidFill>
-            <a:schemeClr val="accent2">
-              <a:lumMod val="60000"/>
-              <a:lumOff val="40000"/>
-            </a:schemeClr>
-          </a:solidFill>
-          <a:ln w="3175">
-            <a:solidFill>
-              <a:srgbClr val="C00000"/>
-            </a:solidFill>
-          </a:ln>
-        </p:spPr>
-        <p:style>
-          <a:lnRef idx="2">
-            <a:schemeClr val="accent1">
-              <a:shade val="50000"/>
-            </a:schemeClr>
-          </a:lnRef>
-          <a:fillRef idx="1">
-            <a:schemeClr val="accent1"/>
-          </a:fillRef>
-          <a:effectRef idx="0">
-            <a:schemeClr val="accent1"/>
-          </a:effectRef>
-          <a:fontRef idx="minor">
-            <a:schemeClr val="lt1"/>
-          </a:fontRef>
-        </p:style>
-        <p:txBody>
-          <a:bodyPr lIns="0" tIns="0" rIns="0" bIns="0" rtlCol="0" anchor="ctr"/>
-          <a:lstStyle/>
-          <a:p>
-            <a:pPr algn="ctr"/>
-            <a:endParaRPr lang="en-SG" sz="900" dirty="0"/>
-          </a:p>
-        </p:txBody>
-      </p:sp>
-      <p:cxnSp>
-        <p:nvCxnSpPr>
-          <p:cNvPr id="33" name="Straight Connector 32"/>
-          <p:cNvCxnSpPr>
-            <a:endCxn id="32" idx="0"/>
-          </p:cNvCxnSpPr>
-          <p:nvPr/>
-        </p:nvCxnSpPr>
-        <p:spPr>
-          <a:xfrm>
-            <a:off x="7293193" y="4265137"/>
-            <a:ext cx="0" cy="71255"/>
-          </a:xfrm>
-          <a:prstGeom prst="line">
-            <a:avLst/>
-          </a:prstGeom>
-          <a:ln>
-            <a:solidFill>
-              <a:srgbClr val="C00000"/>
-            </a:solidFill>
-          </a:ln>
-        </p:spPr>
-        <p:style>
-          <a:lnRef idx="1">
-            <a:schemeClr val="accent1"/>
-          </a:lnRef>
-          <a:fillRef idx="0">
-            <a:schemeClr val="accent1"/>
-          </a:fillRef>
-          <a:effectRef idx="0">
-            <a:schemeClr val="accent1"/>
-          </a:effectRef>
-          <a:fontRef idx="minor">
-            <a:schemeClr val="tx1"/>
-          </a:fontRef>
-        </p:style>
-      </p:cxnSp>
     </p:spTree>
     <p:extLst>
       <p:ext uri="{BB962C8B-B14F-4D97-AF65-F5344CB8AC3E}">

</xml_diff>

<commit_message>
admin: tweak upto v1.2
</commit_message>
<xml_diff>
--- a/diagrams/admin/timeline.pptx
+++ b/diagrams/admin/timeline.pptx
@@ -305,7 +305,7 @@
             <a:fld id="{1D8BD707-D9CF-40AE-B4C6-C98DA3205C09}" type="datetimeFigureOut">
               <a:rPr lang="en-US" smtClean="0"/>
               <a:pPr/>
-              <a:t>31-Dec-17</a:t>
+              <a:t>2018-07-04</a:t>
             </a:fld>
             <a:endParaRPr lang="en-US"/>
           </a:p>
@@ -472,7 +472,7 @@
             <a:fld id="{1D8BD707-D9CF-40AE-B4C6-C98DA3205C09}" type="datetimeFigureOut">
               <a:rPr lang="en-US" smtClean="0"/>
               <a:pPr/>
-              <a:t>31-Dec-17</a:t>
+              <a:t>2018-07-04</a:t>
             </a:fld>
             <a:endParaRPr lang="en-US"/>
           </a:p>
@@ -649,7 +649,7 @@
             <a:fld id="{1D8BD707-D9CF-40AE-B4C6-C98DA3205C09}" type="datetimeFigureOut">
               <a:rPr lang="en-US" smtClean="0"/>
               <a:pPr/>
-              <a:t>31-Dec-17</a:t>
+              <a:t>2018-07-04</a:t>
             </a:fld>
             <a:endParaRPr lang="en-US"/>
           </a:p>
@@ -816,7 +816,7 @@
             <a:fld id="{1D8BD707-D9CF-40AE-B4C6-C98DA3205C09}" type="datetimeFigureOut">
               <a:rPr lang="en-US" smtClean="0"/>
               <a:pPr/>
-              <a:t>31-Dec-17</a:t>
+              <a:t>2018-07-04</a:t>
             </a:fld>
             <a:endParaRPr lang="en-US"/>
           </a:p>
@@ -1059,7 +1059,7 @@
             <a:fld id="{1D8BD707-D9CF-40AE-B4C6-C98DA3205C09}" type="datetimeFigureOut">
               <a:rPr lang="en-US" smtClean="0"/>
               <a:pPr/>
-              <a:t>31-Dec-17</a:t>
+              <a:t>2018-07-04</a:t>
             </a:fld>
             <a:endParaRPr lang="en-US"/>
           </a:p>
@@ -1344,7 +1344,7 @@
             <a:fld id="{1D8BD707-D9CF-40AE-B4C6-C98DA3205C09}" type="datetimeFigureOut">
               <a:rPr lang="en-US" smtClean="0"/>
               <a:pPr/>
-              <a:t>31-Dec-17</a:t>
+              <a:t>2018-07-04</a:t>
             </a:fld>
             <a:endParaRPr lang="en-US"/>
           </a:p>
@@ -1763,7 +1763,7 @@
             <a:fld id="{1D8BD707-D9CF-40AE-B4C6-C98DA3205C09}" type="datetimeFigureOut">
               <a:rPr lang="en-US" smtClean="0"/>
               <a:pPr/>
-              <a:t>31-Dec-17</a:t>
+              <a:t>2018-07-04</a:t>
             </a:fld>
             <a:endParaRPr lang="en-US"/>
           </a:p>
@@ -1878,7 +1878,7 @@
             <a:fld id="{1D8BD707-D9CF-40AE-B4C6-C98DA3205C09}" type="datetimeFigureOut">
               <a:rPr lang="en-US" smtClean="0"/>
               <a:pPr/>
-              <a:t>31-Dec-17</a:t>
+              <a:t>2018-07-04</a:t>
             </a:fld>
             <a:endParaRPr lang="en-US"/>
           </a:p>
@@ -1970,7 +1970,7 @@
             <a:fld id="{1D8BD707-D9CF-40AE-B4C6-C98DA3205C09}" type="datetimeFigureOut">
               <a:rPr lang="en-US" smtClean="0"/>
               <a:pPr/>
-              <a:t>31-Dec-17</a:t>
+              <a:t>2018-07-04</a:t>
             </a:fld>
             <a:endParaRPr lang="en-US"/>
           </a:p>
@@ -2244,7 +2244,7 @@
             <a:fld id="{1D8BD707-D9CF-40AE-B4C6-C98DA3205C09}" type="datetimeFigureOut">
               <a:rPr lang="en-US" smtClean="0"/>
               <a:pPr/>
-              <a:t>31-Dec-17</a:t>
+              <a:t>2018-07-04</a:t>
             </a:fld>
             <a:endParaRPr lang="en-US"/>
           </a:p>
@@ -2494,7 +2494,7 @@
             <a:fld id="{1D8BD707-D9CF-40AE-B4C6-C98DA3205C09}" type="datetimeFigureOut">
               <a:rPr lang="en-US" smtClean="0"/>
               <a:pPr/>
-              <a:t>31-Dec-17</a:t>
+              <a:t>2018-07-04</a:t>
             </a:fld>
             <a:endParaRPr lang="en-US"/>
           </a:p>
@@ -2704,7 +2704,7 @@
             <a:fld id="{1D8BD707-D9CF-40AE-B4C6-C98DA3205C09}" type="datetimeFigureOut">
               <a:rPr lang="en-US" smtClean="0"/>
               <a:pPr/>
-              <a:t>31-Dec-17</a:t>
+              <a:t>2018-07-04</a:t>
             </a:fld>
             <a:endParaRPr lang="en-US"/>
           </a:p>
@@ -3468,7 +3468,7 @@
         </p:nvSpPr>
         <p:spPr>
           <a:xfrm>
-            <a:off x="4884131" y="4027950"/>
+            <a:off x="4419600" y="3657600"/>
             <a:ext cx="426108" cy="340072"/>
           </a:xfrm>
           <a:prstGeom prst="roundRect">
@@ -3522,7 +3522,7 @@
         </p:nvSpPr>
         <p:spPr>
           <a:xfrm>
-            <a:off x="5349514" y="4018503"/>
+            <a:off x="5474881" y="3657600"/>
             <a:ext cx="468719" cy="374080"/>
           </a:xfrm>
           <a:prstGeom prst="roundRect">
@@ -3568,7 +3568,7 @@
       </p:sp>
       <p:sp>
         <p:nvSpPr>
-          <p:cNvPr id="8" name="Rounded Rectangle 7"/>
+          <p:cNvPr id="9" name="Rounded Rectangle 8"/>
           <p:cNvSpPr>
             <a:spLocks noChangeAspect="1"/>
           </p:cNvSpPr>
@@ -3576,61 +3576,7 @@
         </p:nvSpPr>
         <p:spPr>
           <a:xfrm>
-            <a:off x="5857508" y="4008112"/>
-            <a:ext cx="515590" cy="411488"/>
-          </a:xfrm>
-          <a:prstGeom prst="roundRect">
-            <a:avLst/>
-          </a:prstGeom>
-          <a:solidFill>
-            <a:schemeClr val="accent6">
-              <a:lumMod val="75000"/>
-            </a:schemeClr>
-          </a:solidFill>
-          <a:ln w="3175">
-            <a:noFill/>
-          </a:ln>
-        </p:spPr>
-        <p:style>
-          <a:lnRef idx="2">
-            <a:schemeClr val="accent1">
-              <a:shade val="50000"/>
-            </a:schemeClr>
-          </a:lnRef>
-          <a:fillRef idx="1">
-            <a:schemeClr val="accent1"/>
-          </a:fillRef>
-          <a:effectRef idx="0">
-            <a:schemeClr val="accent1"/>
-          </a:effectRef>
-          <a:fontRef idx="minor">
-            <a:schemeClr val="lt1"/>
-          </a:fontRef>
-        </p:style>
-        <p:txBody>
-          <a:bodyPr lIns="0" tIns="0" rIns="0" bIns="0" rtlCol="0" anchor="ctr"/>
-          <a:lstStyle/>
-          <a:p>
-            <a:pPr algn="ctr"/>
-            <a:r>
-              <a:rPr lang="en-US" sz="1050" dirty="0" smtClean="0"/>
-              <a:t>v1.3</a:t>
-            </a:r>
-            <a:endParaRPr lang="en-SG" sz="1050" dirty="0"/>
-          </a:p>
-        </p:txBody>
-      </p:sp>
-      <p:sp>
-        <p:nvSpPr>
-          <p:cNvPr id="9" name="Rounded Rectangle 8"/>
-          <p:cNvSpPr>
-            <a:spLocks noChangeAspect="1"/>
-          </p:cNvSpPr>
-          <p:nvPr/>
-        </p:nvSpPr>
-        <p:spPr>
-          <a:xfrm>
-            <a:off x="6412373" y="3996681"/>
+            <a:off x="6553200" y="3657600"/>
             <a:ext cx="567149" cy="452637"/>
           </a:xfrm>
           <a:prstGeom prst="roundRect">
@@ -3668,7 +3614,7 @@
             <a:pPr algn="ctr"/>
             <a:r>
               <a:rPr lang="en-US" sz="1100" dirty="0" smtClean="0"/>
-              <a:t>v1.4</a:t>
+              <a:t>v1.3</a:t>
             </a:r>
             <a:endParaRPr lang="en-SG" sz="1100" dirty="0"/>
           </a:p>
@@ -3676,7 +3622,7 @@
       </p:sp>
       <p:sp>
         <p:nvSpPr>
-          <p:cNvPr id="10" name="Rounded Rectangle 9"/>
+          <p:cNvPr id="11" name="Rounded Rectangle 10"/>
           <p:cNvSpPr>
             <a:spLocks noChangeAspect="1"/>
           </p:cNvSpPr>
@@ -3684,61 +3630,7 @@
         </p:nvSpPr>
         <p:spPr>
           <a:xfrm>
-            <a:off x="7018798" y="3984108"/>
-            <a:ext cx="623863" cy="497900"/>
-          </a:xfrm>
-          <a:prstGeom prst="roundRect">
-            <a:avLst/>
-          </a:prstGeom>
-          <a:solidFill>
-            <a:schemeClr val="accent6">
-              <a:lumMod val="75000"/>
-            </a:schemeClr>
-          </a:solidFill>
-          <a:ln w="3175">
-            <a:noFill/>
-          </a:ln>
-        </p:spPr>
-        <p:style>
-          <a:lnRef idx="2">
-            <a:schemeClr val="accent1">
-              <a:shade val="50000"/>
-            </a:schemeClr>
-          </a:lnRef>
-          <a:fillRef idx="1">
-            <a:schemeClr val="accent1"/>
-          </a:fillRef>
-          <a:effectRef idx="0">
-            <a:schemeClr val="accent1"/>
-          </a:effectRef>
-          <a:fontRef idx="minor">
-            <a:schemeClr val="lt1"/>
-          </a:fontRef>
-        </p:style>
-        <p:txBody>
-          <a:bodyPr lIns="0" tIns="0" rIns="0" bIns="0" rtlCol="0" anchor="ctr"/>
-          <a:lstStyle/>
-          <a:p>
-            <a:pPr algn="ctr"/>
-            <a:r>
-              <a:rPr lang="en-US" sz="1200" dirty="0" smtClean="0"/>
-              <a:t>v1.5rc</a:t>
-            </a:r>
-            <a:endParaRPr lang="en-SG" sz="1200" dirty="0"/>
-          </a:p>
-        </p:txBody>
-      </p:sp>
-      <p:sp>
-        <p:nvSpPr>
-          <p:cNvPr id="11" name="Rounded Rectangle 10"/>
-          <p:cNvSpPr>
-            <a:spLocks noChangeAspect="1"/>
-          </p:cNvSpPr>
-          <p:nvPr/>
-        </p:nvSpPr>
-        <p:spPr>
-          <a:xfrm>
-            <a:off x="7681937" y="3984107"/>
+            <a:off x="7681937" y="3657600"/>
             <a:ext cx="623863" cy="521631"/>
           </a:xfrm>
           <a:prstGeom prst="roundRect">
@@ -3776,7 +3668,7 @@
             <a:pPr algn="ctr"/>
             <a:r>
               <a:rPr lang="en-US" sz="1400" dirty="0" smtClean="0"/>
-              <a:t>v1.5</a:t>
+              <a:t>v1.4</a:t>
             </a:r>
             <a:endParaRPr lang="en-SG" sz="1400" dirty="0"/>
           </a:p>
@@ -3792,7 +3684,7 @@
         </p:nvSpPr>
         <p:spPr>
           <a:xfrm>
-            <a:off x="4457484" y="4036536"/>
+            <a:off x="2965429" y="3657600"/>
             <a:ext cx="387371" cy="309156"/>
           </a:xfrm>
           <a:prstGeom prst="roundRect">
@@ -3846,7 +3738,7 @@
         </p:nvSpPr>
         <p:spPr>
           <a:xfrm>
-            <a:off x="458071" y="4066275"/>
+            <a:off x="458071" y="3657600"/>
             <a:ext cx="303929" cy="207818"/>
           </a:xfrm>
           <a:prstGeom prst="roundRect">
@@ -3856,9 +3748,7 @@
             <a:srgbClr val="00B050"/>
           </a:solidFill>
           <a:ln w="3175">
-            <a:solidFill>
-              <a:srgbClr val="00B050"/>
-            </a:solidFill>
+            <a:noFill/>
           </a:ln>
         </p:spPr>
         <p:style>
@@ -3900,7 +3790,7 @@
         </p:nvSpPr>
         <p:spPr>
           <a:xfrm>
-            <a:off x="1852463" y="4044454"/>
+            <a:off x="1066800" y="3657600"/>
             <a:ext cx="357338" cy="251460"/>
           </a:xfrm>
           <a:prstGeom prst="roundRect">
@@ -3910,9 +3800,7 @@
             <a:srgbClr val="00B050"/>
           </a:solidFill>
           <a:ln w="3175">
-            <a:solidFill>
-              <a:srgbClr val="00B050"/>
-            </a:solidFill>
+            <a:noFill/>
           </a:ln>
         </p:spPr>
         <p:style>
@@ -3954,7 +3842,7 @@
         </p:nvSpPr>
         <p:spPr>
           <a:xfrm>
-            <a:off x="2908082" y="4044454"/>
+            <a:off x="1600200" y="3657600"/>
             <a:ext cx="414871" cy="251460"/>
           </a:xfrm>
           <a:prstGeom prst="roundRect">
@@ -3964,9 +3852,7 @@
             <a:srgbClr val="00B050"/>
           </a:solidFill>
           <a:ln w="3175">
-            <a:solidFill>
-              <a:srgbClr val="00B050"/>
-            </a:solidFill>
+            <a:noFill/>
           </a:ln>
         </p:spPr>
         <p:style>
@@ -4008,19 +3894,19 @@
         </p:nvSpPr>
         <p:spPr>
           <a:xfrm>
-            <a:off x="3619861" y="4018051"/>
+            <a:off x="2169766" y="3657600"/>
             <a:ext cx="418739" cy="277863"/>
           </a:xfrm>
           <a:prstGeom prst="roundRect">
             <a:avLst/>
           </a:prstGeom>
           <a:solidFill>
-            <a:srgbClr val="00B050"/>
+            <a:schemeClr val="accent6">
+              <a:lumMod val="75000"/>
+            </a:schemeClr>
           </a:solidFill>
           <a:ln w="3175">
-            <a:solidFill>
-              <a:srgbClr val="00B050"/>
-            </a:solidFill>
+            <a:noFill/>
           </a:ln>
         </p:spPr>
         <p:style>
@@ -4045,128 +3931,8 @@
           <a:p>
             <a:pPr algn="ctr"/>
             <a:r>
-              <a:rPr lang="en-US" sz="1200" dirty="0" smtClean="0"/>
+              <a:rPr lang="en-US" sz="900" dirty="0"/>
               <a:t>AB4</a:t>
-            </a:r>
-            <a:endParaRPr lang="en-SG" sz="1200" dirty="0"/>
-          </a:p>
-        </p:txBody>
-      </p:sp>
-      <p:sp>
-        <p:nvSpPr>
-          <p:cNvPr id="19" name="Rectangle 18"/>
-          <p:cNvSpPr/>
-          <p:nvPr/>
-        </p:nvSpPr>
-        <p:spPr>
-          <a:xfrm>
-            <a:off x="457200" y="3567031"/>
-            <a:ext cx="2819400" cy="237882"/>
-          </a:xfrm>
-          <a:prstGeom prst="rect">
-            <a:avLst/>
-          </a:prstGeom>
-          <a:solidFill>
-            <a:srgbClr val="00B050"/>
-          </a:solidFill>
-          <a:ln w="12700">
-            <a:solidFill>
-              <a:schemeClr val="bg1"/>
-            </a:solidFill>
-          </a:ln>
-        </p:spPr>
-        <p:style>
-          <a:lnRef idx="2">
-            <a:schemeClr val="accent1">
-              <a:shade val="50000"/>
-            </a:schemeClr>
-          </a:lnRef>
-          <a:fillRef idx="1">
-            <a:schemeClr val="accent1"/>
-          </a:fillRef>
-          <a:effectRef idx="0">
-            <a:schemeClr val="accent1"/>
-          </a:effectRef>
-          <a:fontRef idx="minor">
-            <a:schemeClr val="lt1"/>
-          </a:fontRef>
-        </p:style>
-        <p:txBody>
-          <a:bodyPr rot="0" spcFirstLastPara="0" vertOverflow="overflow" horzOverflow="overflow" vert="horz" wrap="square" lIns="0" tIns="0" rIns="0" bIns="0" numCol="1" spcCol="0" rtlCol="0" fromWordArt="0" anchor="ctr" anchorCtr="0" forceAA="0" compatLnSpc="1">
-            <a:prstTxWarp prst="textNoShape">
-              <a:avLst/>
-            </a:prstTxWarp>
-            <a:noAutofit/>
-          </a:bodyPr>
-          <a:lstStyle/>
-          <a:p>
-            <a:pPr algn="ctr"/>
-            <a:r>
-              <a:rPr lang="en-US" sz="900" dirty="0"/>
-              <a:t>Phase A</a:t>
-            </a:r>
-            <a:endParaRPr lang="en-SG" sz="900" dirty="0"/>
-          </a:p>
-        </p:txBody>
-      </p:sp>
-      <p:sp>
-        <p:nvSpPr>
-          <p:cNvPr id="20" name="Rectangle 45"/>
-          <p:cNvSpPr/>
-          <p:nvPr/>
-        </p:nvSpPr>
-        <p:spPr>
-          <a:xfrm>
-            <a:off x="3276600" y="3567030"/>
-            <a:ext cx="5486400" cy="237883"/>
-          </a:xfrm>
-          <a:prstGeom prst="rect">
-            <a:avLst/>
-          </a:prstGeom>
-          <a:solidFill>
-            <a:schemeClr val="accent6">
-              <a:lumMod val="75000"/>
-            </a:schemeClr>
-          </a:solidFill>
-          <a:ln w="12700">
-            <a:solidFill>
-              <a:schemeClr val="bg1"/>
-            </a:solidFill>
-          </a:ln>
-        </p:spPr>
-        <p:style>
-          <a:lnRef idx="2">
-            <a:schemeClr val="accent1">
-              <a:shade val="50000"/>
-            </a:schemeClr>
-          </a:lnRef>
-          <a:fillRef idx="1">
-            <a:schemeClr val="accent1"/>
-          </a:fillRef>
-          <a:effectRef idx="0">
-            <a:schemeClr val="accent1"/>
-          </a:effectRef>
-          <a:fontRef idx="minor">
-            <a:schemeClr val="lt1"/>
-          </a:fontRef>
-        </p:style>
-        <p:txBody>
-          <a:bodyPr rot="0" spcFirstLastPara="0" vertOverflow="overflow" horzOverflow="overflow" vert="horz" wrap="square" lIns="0" tIns="0" rIns="0" bIns="0" numCol="1" spcCol="0" rtlCol="0" fromWordArt="0" anchor="ctr" anchorCtr="0" forceAA="0" compatLnSpc="1">
-            <a:prstTxWarp prst="textNoShape">
-              <a:avLst/>
-            </a:prstTxWarp>
-            <a:noAutofit/>
-          </a:bodyPr>
-          <a:lstStyle/>
-          <a:p>
-            <a:pPr algn="ctr"/>
-            <a:r>
-              <a:rPr lang="en-US" sz="900" dirty="0"/>
-              <a:t>Phase </a:t>
-            </a:r>
-            <a:r>
-              <a:rPr lang="en-US" sz="900" dirty="0" smtClean="0"/>
-              <a:t>B</a:t>
             </a:r>
             <a:endParaRPr lang="en-SG" sz="900" dirty="0"/>
           </a:p>
@@ -4182,6 +3948,13 @@
   <p:clrMapOvr>
     <a:masterClrMapping/>
   </p:clrMapOvr>
+  <p:timing>
+    <p:tnLst>
+      <p:par>
+        <p:cTn id="1" dur="indefinite" restart="never" nodeType="tmRoot"/>
+      </p:par>
+    </p:tnLst>
+  </p:timing>
 </p:sld>
 </file>
 

</xml_diff>